<commit_message>
The final version as presented today.
</commit_message>
<xml_diff>
--- a/slides/da2022-lecture-02.pptx
+++ b/slides/da2022-lecture-02.pptx
@@ -5,10 +5,10 @@
     <p:sldMasterId id="2147483648" r:id="rId1"/>
   </p:sldMasterIdLst>
   <p:notesMasterIdLst>
-    <p:notesMasterId r:id="rId25"/>
+    <p:notesMasterId r:id="rId15"/>
   </p:notesMasterIdLst>
   <p:handoutMasterIdLst>
-    <p:handoutMasterId r:id="rId26"/>
+    <p:handoutMasterId r:id="rId16"/>
   </p:handoutMasterIdLst>
   <p:sldIdLst>
     <p:sldId id="258" r:id="rId2"/>
@@ -16,24 +16,14 @@
     <p:sldId id="284" r:id="rId4"/>
     <p:sldId id="285" r:id="rId5"/>
     <p:sldId id="286" r:id="rId6"/>
-    <p:sldId id="283" r:id="rId7"/>
-    <p:sldId id="294" r:id="rId8"/>
-    <p:sldId id="295" r:id="rId9"/>
-    <p:sldId id="293" r:id="rId10"/>
-    <p:sldId id="296" r:id="rId11"/>
-    <p:sldId id="297" r:id="rId12"/>
-    <p:sldId id="298" r:id="rId13"/>
-    <p:sldId id="299" r:id="rId14"/>
-    <p:sldId id="306" r:id="rId15"/>
-    <p:sldId id="300" r:id="rId16"/>
-    <p:sldId id="301" r:id="rId17"/>
-    <p:sldId id="302" r:id="rId18"/>
-    <p:sldId id="287" r:id="rId19"/>
-    <p:sldId id="288" r:id="rId20"/>
-    <p:sldId id="289" r:id="rId21"/>
-    <p:sldId id="290" r:id="rId22"/>
-    <p:sldId id="291" r:id="rId23"/>
-    <p:sldId id="292" r:id="rId24"/>
+    <p:sldId id="294" r:id="rId7"/>
+    <p:sldId id="295" r:id="rId8"/>
+    <p:sldId id="293" r:id="rId9"/>
+    <p:sldId id="296" r:id="rId10"/>
+    <p:sldId id="297" r:id="rId11"/>
+    <p:sldId id="298" r:id="rId12"/>
+    <p:sldId id="299" r:id="rId13"/>
+    <p:sldId id="306" r:id="rId14"/>
   </p:sldIdLst>
   <p:sldSz cx="12192000" cy="6858000"/>
   <p:notesSz cx="6858000" cy="9144000"/>
@@ -4648,148 +4638,6 @@
               <a:rPr lang="en-US" sz="6000" dirty="0">
                 <a:latin typeface="Bernina Sans Light" pitchFamily="2" charset="77"/>
               </a:rPr>
-              <a:t>Smallest</a:t>
-            </a:r>
-            <a:br>
-              <a:rPr lang="en-US" sz="6000" dirty="0">
-                <a:latin typeface="Bernina Sans Light" pitchFamily="2" charset="77"/>
-              </a:rPr>
-            </a:br>
-            <a:r>
-              <a:rPr lang="en-US" sz="6000" dirty="0">
-                <a:latin typeface="Bernina Sans Light" pitchFamily="2" charset="77"/>
-              </a:rPr>
-              <a:t>set of nodes</a:t>
-            </a:r>
-            <a:br>
-              <a:rPr lang="en-US" sz="6000" dirty="0">
-                <a:latin typeface="Bernina Sans Light" pitchFamily="2" charset="77"/>
-              </a:rPr>
-            </a:br>
-            <a:r>
-              <a:rPr lang="en-US" sz="6000" dirty="0">
-                <a:latin typeface="Bernina Sans Light" pitchFamily="2" charset="77"/>
-              </a:rPr>
-              <a:t>that is both</a:t>
-            </a:r>
-            <a:br>
-              <a:rPr lang="en-US" sz="6000" dirty="0">
-                <a:latin typeface="Bernina Sans Light" pitchFamily="2" charset="77"/>
-              </a:rPr>
-            </a:br>
-            <a:r>
-              <a:rPr lang="en-US" sz="6000" dirty="0">
-                <a:latin typeface="Bernina Sans Light" pitchFamily="2" charset="77"/>
-              </a:rPr>
-              <a:t>an independent set</a:t>
-            </a:r>
-            <a:br>
-              <a:rPr lang="en-US" sz="6000" dirty="0">
-                <a:latin typeface="Bernina Sans Light" pitchFamily="2" charset="77"/>
-              </a:rPr>
-            </a:br>
-            <a:r>
-              <a:rPr lang="en-US" sz="6000" dirty="0">
-                <a:latin typeface="Bernina Sans Light" pitchFamily="2" charset="77"/>
-              </a:rPr>
-              <a:t>and a dominating set</a:t>
-            </a:r>
-          </a:p>
-        </p:txBody>
-      </p:sp>
-      <p:pic>
-        <p:nvPicPr>
-          <p:cNvPr id="11" name="Picture 10">
-            <a:extLst>
-              <a:ext uri="{FF2B5EF4-FFF2-40B4-BE49-F238E27FC236}">
-                <a16:creationId xmlns:a16="http://schemas.microsoft.com/office/drawing/2014/main" id="{FD70D490-D0D3-844D-A288-DEF6D99890E7}"/>
-              </a:ext>
-            </a:extLst>
-          </p:cNvPr>
-          <p:cNvPicPr>
-            <a:picLocks noChangeAspect="1"/>
-          </p:cNvPicPr>
-          <p:nvPr/>
-        </p:nvPicPr>
-        <p:blipFill>
-          <a:blip r:embed="rId2"/>
-          <a:stretch>
-            <a:fillRect/>
-          </a:stretch>
-        </p:blipFill>
-        <p:spPr>
-          <a:xfrm>
-            <a:off x="6472838" y="365125"/>
-            <a:ext cx="5261962" cy="3423104"/>
-          </a:xfrm>
-          <a:prstGeom prst="rect">
-            <a:avLst/>
-          </a:prstGeom>
-        </p:spPr>
-      </p:pic>
-    </p:spTree>
-    <p:extLst>
-      <p:ext uri="{BB962C8B-B14F-4D97-AF65-F5344CB8AC3E}">
-        <p14:creationId xmlns:p14="http://schemas.microsoft.com/office/powerpoint/2010/main" val="1836756029"/>
-      </p:ext>
-    </p:extLst>
-  </p:cSld>
-  <p:clrMapOvr>
-    <a:masterClrMapping/>
-  </p:clrMapOvr>
-</p:sld>
-</file>
-
-<file path=ppt/slides/slide11.xml><?xml version="1.0" encoding="utf-8"?>
-<p:sld xmlns:a="http://schemas.openxmlformats.org/drawingml/2006/main" xmlns:r="http://schemas.openxmlformats.org/officeDocument/2006/relationships" xmlns:p="http://schemas.openxmlformats.org/presentationml/2006/main">
-  <p:cSld>
-    <p:spTree>
-      <p:nvGrpSpPr>
-        <p:cNvPr id="1" name=""/>
-        <p:cNvGrpSpPr/>
-        <p:nvPr/>
-      </p:nvGrpSpPr>
-      <p:grpSpPr>
-        <a:xfrm>
-          <a:off x="0" y="0"/>
-          <a:ext cx="0" cy="0"/>
-          <a:chOff x="0" y="0"/>
-          <a:chExt cx="0" cy="0"/>
-        </a:xfrm>
-      </p:grpSpPr>
-      <p:sp>
-        <p:nvSpPr>
-          <p:cNvPr id="4" name="Content Placeholder 3">
-            <a:extLst>
-              <a:ext uri="{FF2B5EF4-FFF2-40B4-BE49-F238E27FC236}">
-                <a16:creationId xmlns:a16="http://schemas.microsoft.com/office/drawing/2014/main" id="{134313D6-EA35-AA4C-8B33-AE41A555EEE1}"/>
-              </a:ext>
-            </a:extLst>
-          </p:cNvPr>
-          <p:cNvSpPr>
-            <a:spLocks noGrp="1"/>
-          </p:cNvSpPr>
-          <p:nvPr>
-            <p:ph idx="1"/>
-          </p:nvPr>
-        </p:nvSpPr>
-        <p:spPr>
-          <a:xfrm>
-            <a:off x="838200" y="365125"/>
-            <a:ext cx="10515600" cy="5811838"/>
-          </a:xfrm>
-        </p:spPr>
-        <p:txBody>
-          <a:bodyPr anchor="b"/>
-          <a:lstStyle/>
-          <a:p>
-            <a:pPr marL="0" indent="0">
-              <a:buNone/>
-            </a:pPr>
-            <a:r>
-              <a:rPr lang="en-US" sz="6000" dirty="0">
-                <a:latin typeface="Bernina Sans Light" pitchFamily="2" charset="77"/>
-              </a:rPr>
               <a:t>Largest</a:t>
             </a:r>
             <a:br>
@@ -4882,7 +4730,7 @@
 </p:sld>
 </file>
 
-<file path=ppt/slides/slide12.xml><?xml version="1.0" encoding="utf-8"?>
+<file path=ppt/slides/slide11.xml><?xml version="1.0" encoding="utf-8"?>
 <p:sld xmlns:a="http://schemas.openxmlformats.org/drawingml/2006/main" xmlns:r="http://schemas.openxmlformats.org/officeDocument/2006/relationships" xmlns:p="http://schemas.openxmlformats.org/presentationml/2006/main">
   <p:cSld>
     <p:spTree>
@@ -4991,7 +4839,7 @@
 </p:sld>
 </file>
 
-<file path=ppt/slides/slide13.xml><?xml version="1.0" encoding="utf-8"?>
+<file path=ppt/slides/slide12.xml><?xml version="1.0" encoding="utf-8"?>
 <p:sld xmlns:a="http://schemas.openxmlformats.org/drawingml/2006/main" xmlns:r="http://schemas.openxmlformats.org/officeDocument/2006/relationships" xmlns:p="http://schemas.openxmlformats.org/presentationml/2006/main">
   <p:cSld>
     <p:spTree>
@@ -5100,7 +4948,7 @@
 </p:sld>
 </file>
 
-<file path=ppt/slides/slide14.xml><?xml version="1.0" encoding="utf-8"?>
+<file path=ppt/slides/slide13.xml><?xml version="1.0" encoding="utf-8"?>
 <p:sld xmlns:a="http://schemas.openxmlformats.org/drawingml/2006/main" xmlns:r="http://schemas.openxmlformats.org/officeDocument/2006/relationships" xmlns:p="http://schemas.openxmlformats.org/presentationml/2006/main">
   <p:cSld>
     <p:spTree>
@@ -5209,672 +5057,6 @@
 </p:sld>
 </file>
 
-<file path=ppt/slides/slide15.xml><?xml version="1.0" encoding="utf-8"?>
-<p:sld xmlns:a="http://schemas.openxmlformats.org/drawingml/2006/main" xmlns:r="http://schemas.openxmlformats.org/officeDocument/2006/relationships" xmlns:p="http://schemas.openxmlformats.org/presentationml/2006/main">
-  <p:cSld>
-    <p:spTree>
-      <p:nvGrpSpPr>
-        <p:cNvPr id="1" name=""/>
-        <p:cNvGrpSpPr/>
-        <p:nvPr/>
-      </p:nvGrpSpPr>
-      <p:grpSpPr>
-        <a:xfrm>
-          <a:off x="0" y="0"/>
-          <a:ext cx="0" cy="0"/>
-          <a:chOff x="0" y="0"/>
-          <a:chExt cx="0" cy="0"/>
-        </a:xfrm>
-      </p:grpSpPr>
-      <p:sp>
-        <p:nvSpPr>
-          <p:cNvPr id="4" name="Content Placeholder 3">
-            <a:extLst>
-              <a:ext uri="{FF2B5EF4-FFF2-40B4-BE49-F238E27FC236}">
-                <a16:creationId xmlns:a16="http://schemas.microsoft.com/office/drawing/2014/main" id="{134313D6-EA35-AA4C-8B33-AE41A555EEE1}"/>
-              </a:ext>
-            </a:extLst>
-          </p:cNvPr>
-          <p:cNvSpPr>
-            <a:spLocks noGrp="1"/>
-          </p:cNvSpPr>
-          <p:nvPr>
-            <p:ph idx="1"/>
-          </p:nvPr>
-        </p:nvSpPr>
-        <p:spPr>
-          <a:xfrm>
-            <a:off x="838200" y="365125"/>
-            <a:ext cx="10515600" cy="5811838"/>
-          </a:xfrm>
-        </p:spPr>
-        <p:txBody>
-          <a:bodyPr anchor="b"/>
-          <a:lstStyle/>
-          <a:p>
-            <a:pPr marL="0" indent="0">
-              <a:buNone/>
-            </a:pPr>
-            <a:r>
-              <a:rPr lang="en-US" sz="6000" dirty="0">
-                <a:latin typeface="Bernina Sans Light" pitchFamily="2" charset="77"/>
-              </a:rPr>
-              <a:t>Smallest</a:t>
-            </a:r>
-            <a:br>
-              <a:rPr lang="en-US" sz="6000" dirty="0">
-                <a:latin typeface="Bernina Sans Light" pitchFamily="2" charset="77"/>
-              </a:rPr>
-            </a:br>
-            <a:r>
-              <a:rPr lang="en-US" sz="6000" dirty="0">
-                <a:latin typeface="Bernina Sans Light" pitchFamily="2" charset="77"/>
-              </a:rPr>
-              <a:t>set of edges</a:t>
-            </a:r>
-            <a:br>
-              <a:rPr lang="en-US" sz="6000" dirty="0">
-                <a:latin typeface="Bernina Sans Light" pitchFamily="2" charset="77"/>
-              </a:rPr>
-            </a:br>
-            <a:r>
-              <a:rPr lang="en-US" sz="6000" dirty="0">
-                <a:latin typeface="Bernina Sans Light" pitchFamily="2" charset="77"/>
-              </a:rPr>
-              <a:t>that is both</a:t>
-            </a:r>
-            <a:br>
-              <a:rPr lang="en-US" sz="6000" dirty="0">
-                <a:latin typeface="Bernina Sans Light" pitchFamily="2" charset="77"/>
-              </a:rPr>
-            </a:br>
-            <a:r>
-              <a:rPr lang="en-US" sz="6000" dirty="0">
-                <a:latin typeface="Bernina Sans Light" pitchFamily="2" charset="77"/>
-              </a:rPr>
-              <a:t>a matching and</a:t>
-            </a:r>
-            <a:br>
-              <a:rPr lang="en-US" sz="6000" dirty="0">
-                <a:latin typeface="Bernina Sans Light" pitchFamily="2" charset="77"/>
-              </a:rPr>
-            </a:br>
-            <a:r>
-              <a:rPr lang="en-US" sz="6000" dirty="0">
-                <a:latin typeface="Bernina Sans Light" pitchFamily="2" charset="77"/>
-              </a:rPr>
-              <a:t>an edge dominating set</a:t>
-            </a:r>
-          </a:p>
-        </p:txBody>
-      </p:sp>
-      <p:pic>
-        <p:nvPicPr>
-          <p:cNvPr id="11" name="Picture 10">
-            <a:extLst>
-              <a:ext uri="{FF2B5EF4-FFF2-40B4-BE49-F238E27FC236}">
-                <a16:creationId xmlns:a16="http://schemas.microsoft.com/office/drawing/2014/main" id="{FD70D490-D0D3-844D-A288-DEF6D99890E7}"/>
-              </a:ext>
-            </a:extLst>
-          </p:cNvPr>
-          <p:cNvPicPr>
-            <a:picLocks noChangeAspect="1"/>
-          </p:cNvPicPr>
-          <p:nvPr/>
-        </p:nvPicPr>
-        <p:blipFill>
-          <a:blip r:embed="rId2"/>
-          <a:stretch>
-            <a:fillRect/>
-          </a:stretch>
-        </p:blipFill>
-        <p:spPr>
-          <a:xfrm>
-            <a:off x="6472838" y="365125"/>
-            <a:ext cx="5261962" cy="3423104"/>
-          </a:xfrm>
-          <a:prstGeom prst="rect">
-            <a:avLst/>
-          </a:prstGeom>
-        </p:spPr>
-      </p:pic>
-    </p:spTree>
-    <p:extLst>
-      <p:ext uri="{BB962C8B-B14F-4D97-AF65-F5344CB8AC3E}">
-        <p14:creationId xmlns:p14="http://schemas.microsoft.com/office/powerpoint/2010/main" val="1232407403"/>
-      </p:ext>
-    </p:extLst>
-  </p:cSld>
-  <p:clrMapOvr>
-    <a:masterClrMapping/>
-  </p:clrMapOvr>
-</p:sld>
-</file>
-
-<file path=ppt/slides/slide16.xml><?xml version="1.0" encoding="utf-8"?>
-<p:sld xmlns:a="http://schemas.openxmlformats.org/drawingml/2006/main" xmlns:r="http://schemas.openxmlformats.org/officeDocument/2006/relationships" xmlns:p="http://schemas.openxmlformats.org/presentationml/2006/main">
-  <p:cSld>
-    <p:spTree>
-      <p:nvGrpSpPr>
-        <p:cNvPr id="1" name=""/>
-        <p:cNvGrpSpPr/>
-        <p:nvPr/>
-      </p:nvGrpSpPr>
-      <p:grpSpPr>
-        <a:xfrm>
-          <a:off x="0" y="0"/>
-          <a:ext cx="0" cy="0"/>
-          <a:chOff x="0" y="0"/>
-          <a:chExt cx="0" cy="0"/>
-        </a:xfrm>
-      </p:grpSpPr>
-      <p:sp>
-        <p:nvSpPr>
-          <p:cNvPr id="4" name="Content Placeholder 3">
-            <a:extLst>
-              <a:ext uri="{FF2B5EF4-FFF2-40B4-BE49-F238E27FC236}">
-                <a16:creationId xmlns:a16="http://schemas.microsoft.com/office/drawing/2014/main" id="{134313D6-EA35-AA4C-8B33-AE41A555EEE1}"/>
-              </a:ext>
-            </a:extLst>
-          </p:cNvPr>
-          <p:cNvSpPr>
-            <a:spLocks noGrp="1"/>
-          </p:cNvSpPr>
-          <p:nvPr>
-            <p:ph idx="1"/>
-          </p:nvPr>
-        </p:nvSpPr>
-        <p:spPr>
-          <a:xfrm>
-            <a:off x="838200" y="365125"/>
-            <a:ext cx="10515600" cy="5811838"/>
-          </a:xfrm>
-        </p:spPr>
-        <p:txBody>
-          <a:bodyPr anchor="b"/>
-          <a:lstStyle/>
-          <a:p>
-            <a:pPr marL="0" indent="0">
-              <a:buNone/>
-            </a:pPr>
-            <a:r>
-              <a:rPr lang="en-US" sz="6000" dirty="0">
-                <a:latin typeface="Bernina Sans Light" pitchFamily="2" charset="77"/>
-              </a:rPr>
-              <a:t>Largest</a:t>
-            </a:r>
-            <a:br>
-              <a:rPr lang="en-US" sz="6000" dirty="0">
-                <a:latin typeface="Bernina Sans Light" pitchFamily="2" charset="77"/>
-              </a:rPr>
-            </a:br>
-            <a:r>
-              <a:rPr lang="en-US" sz="6000" dirty="0">
-                <a:latin typeface="Bernina Sans Light" pitchFamily="2" charset="77"/>
-              </a:rPr>
-              <a:t>set of edges</a:t>
-            </a:r>
-            <a:br>
-              <a:rPr lang="en-US" sz="6000" dirty="0">
-                <a:latin typeface="Bernina Sans Light" pitchFamily="2" charset="77"/>
-              </a:rPr>
-            </a:br>
-            <a:r>
-              <a:rPr lang="en-US" sz="6000" dirty="0">
-                <a:latin typeface="Bernina Sans Light" pitchFamily="2" charset="77"/>
-              </a:rPr>
-              <a:t>that is both</a:t>
-            </a:r>
-            <a:br>
-              <a:rPr lang="en-US" sz="6000" dirty="0">
-                <a:latin typeface="Bernina Sans Light" pitchFamily="2" charset="77"/>
-              </a:rPr>
-            </a:br>
-            <a:r>
-              <a:rPr lang="en-US" sz="6000" dirty="0">
-                <a:latin typeface="Bernina Sans Light" pitchFamily="2" charset="77"/>
-              </a:rPr>
-              <a:t>a matching and</a:t>
-            </a:r>
-            <a:br>
-              <a:rPr lang="en-US" sz="6000" dirty="0">
-                <a:latin typeface="Bernina Sans Light" pitchFamily="2" charset="77"/>
-              </a:rPr>
-            </a:br>
-            <a:r>
-              <a:rPr lang="en-US" sz="6000" dirty="0">
-                <a:latin typeface="Bernina Sans Light" pitchFamily="2" charset="77"/>
-              </a:rPr>
-              <a:t>an edge dominating set</a:t>
-            </a:r>
-          </a:p>
-        </p:txBody>
-      </p:sp>
-      <p:pic>
-        <p:nvPicPr>
-          <p:cNvPr id="11" name="Picture 10">
-            <a:extLst>
-              <a:ext uri="{FF2B5EF4-FFF2-40B4-BE49-F238E27FC236}">
-                <a16:creationId xmlns:a16="http://schemas.microsoft.com/office/drawing/2014/main" id="{FD70D490-D0D3-844D-A288-DEF6D99890E7}"/>
-              </a:ext>
-            </a:extLst>
-          </p:cNvPr>
-          <p:cNvPicPr>
-            <a:picLocks noChangeAspect="1"/>
-          </p:cNvPicPr>
-          <p:nvPr/>
-        </p:nvPicPr>
-        <p:blipFill>
-          <a:blip r:embed="rId2"/>
-          <a:stretch>
-            <a:fillRect/>
-          </a:stretch>
-        </p:blipFill>
-        <p:spPr>
-          <a:xfrm>
-            <a:off x="6472838" y="365125"/>
-            <a:ext cx="5261962" cy="3423104"/>
-          </a:xfrm>
-          <a:prstGeom prst="rect">
-            <a:avLst/>
-          </a:prstGeom>
-        </p:spPr>
-      </p:pic>
-    </p:spTree>
-    <p:extLst>
-      <p:ext uri="{BB962C8B-B14F-4D97-AF65-F5344CB8AC3E}">
-        <p14:creationId xmlns:p14="http://schemas.microsoft.com/office/powerpoint/2010/main" val="2043105635"/>
-      </p:ext>
-    </p:extLst>
-  </p:cSld>
-  <p:clrMapOvr>
-    <a:masterClrMapping/>
-  </p:clrMapOvr>
-</p:sld>
-</file>
-
-<file path=ppt/slides/slide17.xml><?xml version="1.0" encoding="utf-8"?>
-<p:sld xmlns:a="http://schemas.openxmlformats.org/drawingml/2006/main" xmlns:r="http://schemas.openxmlformats.org/officeDocument/2006/relationships" xmlns:p="http://schemas.openxmlformats.org/presentationml/2006/main">
-  <p:cSld>
-    <p:spTree>
-      <p:nvGrpSpPr>
-        <p:cNvPr id="1" name=""/>
-        <p:cNvGrpSpPr/>
-        <p:nvPr/>
-      </p:nvGrpSpPr>
-      <p:grpSpPr>
-        <a:xfrm>
-          <a:off x="0" y="0"/>
-          <a:ext cx="0" cy="0"/>
-          <a:chOff x="0" y="0"/>
-          <a:chExt cx="0" cy="0"/>
-        </a:xfrm>
-      </p:grpSpPr>
-      <p:sp>
-        <p:nvSpPr>
-          <p:cNvPr id="4" name="Content Placeholder 3">
-            <a:extLst>
-              <a:ext uri="{FF2B5EF4-FFF2-40B4-BE49-F238E27FC236}">
-                <a16:creationId xmlns:a16="http://schemas.microsoft.com/office/drawing/2014/main" id="{134313D6-EA35-AA4C-8B33-AE41A555EEE1}"/>
-              </a:ext>
-            </a:extLst>
-          </p:cNvPr>
-          <p:cNvSpPr>
-            <a:spLocks noGrp="1"/>
-          </p:cNvSpPr>
-          <p:nvPr>
-            <p:ph idx="1"/>
-          </p:nvPr>
-        </p:nvSpPr>
-        <p:spPr>
-          <a:xfrm>
-            <a:off x="838200" y="365125"/>
-            <a:ext cx="10515600" cy="5811838"/>
-          </a:xfrm>
-        </p:spPr>
-        <p:txBody>
-          <a:bodyPr anchor="b"/>
-          <a:lstStyle/>
-          <a:p>
-            <a:pPr marL="0" indent="0">
-              <a:buNone/>
-            </a:pPr>
-            <a:r>
-              <a:rPr lang="en-US" sz="6000" dirty="0">
-                <a:latin typeface="Bernina Sans Light" pitchFamily="2" charset="77"/>
-              </a:rPr>
-              <a:t>Minimum</a:t>
-            </a:r>
-            <a:br>
-              <a:rPr lang="en-US" sz="6000" dirty="0">
-                <a:latin typeface="Bernina Sans Light" pitchFamily="2" charset="77"/>
-              </a:rPr>
-            </a:br>
-            <a:r>
-              <a:rPr lang="en-US" sz="6000" dirty="0">
-                <a:latin typeface="Bernina Sans Light" pitchFamily="2" charset="77"/>
-              </a:rPr>
-              <a:t>edge dominating set</a:t>
-            </a:r>
-            <a:br>
-              <a:rPr lang="en-US" sz="6000" dirty="0">
-                <a:latin typeface="Bernina Sans Light" pitchFamily="2" charset="77"/>
-              </a:rPr>
-            </a:br>
-            <a:r>
-              <a:rPr lang="en-US" sz="6000" dirty="0">
-                <a:latin typeface="Bernina Sans Light" pitchFamily="2" charset="77"/>
-              </a:rPr>
-              <a:t>that is not a matching</a:t>
-            </a:r>
-          </a:p>
-        </p:txBody>
-      </p:sp>
-      <p:pic>
-        <p:nvPicPr>
-          <p:cNvPr id="11" name="Picture 10">
-            <a:extLst>
-              <a:ext uri="{FF2B5EF4-FFF2-40B4-BE49-F238E27FC236}">
-                <a16:creationId xmlns:a16="http://schemas.microsoft.com/office/drawing/2014/main" id="{FD70D490-D0D3-844D-A288-DEF6D99890E7}"/>
-              </a:ext>
-            </a:extLst>
-          </p:cNvPr>
-          <p:cNvPicPr>
-            <a:picLocks noChangeAspect="1"/>
-          </p:cNvPicPr>
-          <p:nvPr/>
-        </p:nvPicPr>
-        <p:blipFill>
-          <a:blip r:embed="rId2"/>
-          <a:stretch>
-            <a:fillRect/>
-          </a:stretch>
-        </p:blipFill>
-        <p:spPr>
-          <a:xfrm>
-            <a:off x="6472838" y="365125"/>
-            <a:ext cx="5261962" cy="3423104"/>
-          </a:xfrm>
-          <a:prstGeom prst="rect">
-            <a:avLst/>
-          </a:prstGeom>
-        </p:spPr>
-      </p:pic>
-    </p:spTree>
-    <p:extLst>
-      <p:ext uri="{BB962C8B-B14F-4D97-AF65-F5344CB8AC3E}">
-        <p14:creationId xmlns:p14="http://schemas.microsoft.com/office/powerpoint/2010/main" val="2197597586"/>
-      </p:ext>
-    </p:extLst>
-  </p:cSld>
-  <p:clrMapOvr>
-    <a:masterClrMapping/>
-  </p:clrMapOvr>
-</p:sld>
-</file>
-
-<file path=ppt/slides/slide18.xml><?xml version="1.0" encoding="utf-8"?>
-<p:sld xmlns:a="http://schemas.openxmlformats.org/drawingml/2006/main" xmlns:r="http://schemas.openxmlformats.org/officeDocument/2006/relationships" xmlns:p="http://schemas.openxmlformats.org/presentationml/2006/main">
-  <p:cSld>
-    <p:spTree>
-      <p:nvGrpSpPr>
-        <p:cNvPr id="1" name=""/>
-        <p:cNvGrpSpPr/>
-        <p:nvPr/>
-      </p:nvGrpSpPr>
-      <p:grpSpPr>
-        <a:xfrm>
-          <a:off x="0" y="0"/>
-          <a:ext cx="0" cy="0"/>
-          <a:chOff x="0" y="0"/>
-          <a:chExt cx="0" cy="0"/>
-        </a:xfrm>
-      </p:grpSpPr>
-      <p:sp>
-        <p:nvSpPr>
-          <p:cNvPr id="4" name="Content Placeholder 3">
-            <a:extLst>
-              <a:ext uri="{FF2B5EF4-FFF2-40B4-BE49-F238E27FC236}">
-                <a16:creationId xmlns:a16="http://schemas.microsoft.com/office/drawing/2014/main" id="{134313D6-EA35-AA4C-8B33-AE41A555EEE1}"/>
-              </a:ext>
-            </a:extLst>
-          </p:cNvPr>
-          <p:cNvSpPr>
-            <a:spLocks noGrp="1"/>
-          </p:cNvSpPr>
-          <p:nvPr>
-            <p:ph idx="1"/>
-          </p:nvPr>
-        </p:nvSpPr>
-        <p:spPr>
-          <a:xfrm>
-            <a:off x="838200" y="365125"/>
-            <a:ext cx="10515600" cy="5811838"/>
-          </a:xfrm>
-        </p:spPr>
-        <p:txBody>
-          <a:bodyPr anchor="b"/>
-          <a:lstStyle/>
-          <a:p>
-            <a:pPr marL="0" indent="0">
-              <a:buNone/>
-            </a:pPr>
-            <a:r>
-              <a:rPr lang="en-US" sz="6000" dirty="0">
-                <a:latin typeface="Bernina Sans Light" pitchFamily="2" charset="77"/>
-              </a:rPr>
-              <a:t>Largest set of</a:t>
-            </a:r>
-            <a:br>
-              <a:rPr lang="en-US" sz="6000" dirty="0">
-                <a:latin typeface="Bernina Sans Light" pitchFamily="2" charset="77"/>
-              </a:rPr>
-            </a:br>
-            <a:r>
-              <a:rPr lang="en-US" sz="6000" dirty="0">
-                <a:latin typeface="Bernina Sans Light" pitchFamily="2" charset="77"/>
-              </a:rPr>
-              <a:t>nodes that induces</a:t>
-            </a:r>
-            <a:br>
-              <a:rPr lang="en-US" sz="6000" dirty="0">
-                <a:latin typeface="Bernina Sans Light" pitchFamily="2" charset="77"/>
-              </a:rPr>
-            </a:br>
-            <a:r>
-              <a:rPr lang="en-US" sz="6000" dirty="0">
-                <a:latin typeface="Bernina Sans Light" pitchFamily="2" charset="77"/>
-              </a:rPr>
-              <a:t>a bipartite subgraph</a:t>
-            </a:r>
-          </a:p>
-        </p:txBody>
-      </p:sp>
-      <p:pic>
-        <p:nvPicPr>
-          <p:cNvPr id="11" name="Picture 10">
-            <a:extLst>
-              <a:ext uri="{FF2B5EF4-FFF2-40B4-BE49-F238E27FC236}">
-                <a16:creationId xmlns:a16="http://schemas.microsoft.com/office/drawing/2014/main" id="{FD70D490-D0D3-844D-A288-DEF6D99890E7}"/>
-              </a:ext>
-            </a:extLst>
-          </p:cNvPr>
-          <p:cNvPicPr>
-            <a:picLocks noChangeAspect="1"/>
-          </p:cNvPicPr>
-          <p:nvPr/>
-        </p:nvPicPr>
-        <p:blipFill>
-          <a:blip r:embed="rId2"/>
-          <a:stretch>
-            <a:fillRect/>
-          </a:stretch>
-        </p:blipFill>
-        <p:spPr>
-          <a:xfrm>
-            <a:off x="6472838" y="365125"/>
-            <a:ext cx="5261962" cy="3423104"/>
-          </a:xfrm>
-          <a:prstGeom prst="rect">
-            <a:avLst/>
-          </a:prstGeom>
-        </p:spPr>
-      </p:pic>
-    </p:spTree>
-    <p:extLst>
-      <p:ext uri="{BB962C8B-B14F-4D97-AF65-F5344CB8AC3E}">
-        <p14:creationId xmlns:p14="http://schemas.microsoft.com/office/powerpoint/2010/main" val="1328663725"/>
-      </p:ext>
-    </p:extLst>
-  </p:cSld>
-  <p:clrMapOvr>
-    <a:masterClrMapping/>
-  </p:clrMapOvr>
-</p:sld>
-</file>
-
-<file path=ppt/slides/slide19.xml><?xml version="1.0" encoding="utf-8"?>
-<p:sld xmlns:a="http://schemas.openxmlformats.org/drawingml/2006/main" xmlns:r="http://schemas.openxmlformats.org/officeDocument/2006/relationships" xmlns:p="http://schemas.openxmlformats.org/presentationml/2006/main">
-  <p:cSld>
-    <p:spTree>
-      <p:nvGrpSpPr>
-        <p:cNvPr id="1" name=""/>
-        <p:cNvGrpSpPr/>
-        <p:nvPr/>
-      </p:nvGrpSpPr>
-      <p:grpSpPr>
-        <a:xfrm>
-          <a:off x="0" y="0"/>
-          <a:ext cx="0" cy="0"/>
-          <a:chOff x="0" y="0"/>
-          <a:chExt cx="0" cy="0"/>
-        </a:xfrm>
-      </p:grpSpPr>
-      <p:sp>
-        <p:nvSpPr>
-          <p:cNvPr id="4" name="Content Placeholder 3">
-            <a:extLst>
-              <a:ext uri="{FF2B5EF4-FFF2-40B4-BE49-F238E27FC236}">
-                <a16:creationId xmlns:a16="http://schemas.microsoft.com/office/drawing/2014/main" id="{134313D6-EA35-AA4C-8B33-AE41A555EEE1}"/>
-              </a:ext>
-            </a:extLst>
-          </p:cNvPr>
-          <p:cNvSpPr>
-            <a:spLocks noGrp="1"/>
-          </p:cNvSpPr>
-          <p:nvPr>
-            <p:ph idx="1"/>
-          </p:nvPr>
-        </p:nvSpPr>
-        <p:spPr>
-          <a:xfrm>
-            <a:off x="838200" y="365125"/>
-            <a:ext cx="10515600" cy="5811838"/>
-          </a:xfrm>
-        </p:spPr>
-        <p:txBody>
-          <a:bodyPr anchor="b"/>
-          <a:lstStyle/>
-          <a:p>
-            <a:pPr marL="0" indent="0">
-              <a:buNone/>
-            </a:pPr>
-            <a:r>
-              <a:rPr lang="en-US" sz="6000" dirty="0">
-                <a:latin typeface="Bernina Sans Light" pitchFamily="2" charset="77"/>
-              </a:rPr>
-              <a:t>Largest</a:t>
-            </a:r>
-            <a:br>
-              <a:rPr lang="en-US" sz="6000" dirty="0">
-                <a:latin typeface="Bernina Sans Light" pitchFamily="2" charset="77"/>
-              </a:rPr>
-            </a:br>
-            <a:r>
-              <a:rPr lang="en-US" sz="6000" dirty="0">
-                <a:latin typeface="Bernina Sans Light" pitchFamily="2" charset="77"/>
-              </a:rPr>
-              <a:t>set of edges</a:t>
-            </a:r>
-            <a:br>
-              <a:rPr lang="en-US" sz="6000" dirty="0">
-                <a:latin typeface="Bernina Sans Light" pitchFamily="2" charset="77"/>
-              </a:rPr>
-            </a:br>
-            <a:r>
-              <a:rPr lang="en-US" sz="6000" dirty="0">
-                <a:latin typeface="Bernina Sans Light" pitchFamily="2" charset="77"/>
-              </a:rPr>
-              <a:t>that induces</a:t>
-            </a:r>
-            <a:br>
-              <a:rPr lang="en-US" sz="6000" dirty="0">
-                <a:latin typeface="Bernina Sans Light" pitchFamily="2" charset="77"/>
-              </a:rPr>
-            </a:br>
-            <a:r>
-              <a:rPr lang="en-US" sz="6000" dirty="0">
-                <a:latin typeface="Bernina Sans Light" pitchFamily="2" charset="77"/>
-              </a:rPr>
-              <a:t>a subgraph with</a:t>
-            </a:r>
-            <a:br>
-              <a:rPr lang="en-US" sz="6000" dirty="0">
-                <a:latin typeface="Bernina Sans Light" pitchFamily="2" charset="77"/>
-              </a:rPr>
-            </a:br>
-            <a:r>
-              <a:rPr lang="en-US" sz="6000" dirty="0">
-                <a:latin typeface="Bernina Sans Light" pitchFamily="2" charset="77"/>
-              </a:rPr>
-              <a:t>2 connected components</a:t>
-            </a:r>
-          </a:p>
-        </p:txBody>
-      </p:sp>
-      <p:pic>
-        <p:nvPicPr>
-          <p:cNvPr id="11" name="Picture 10">
-            <a:extLst>
-              <a:ext uri="{FF2B5EF4-FFF2-40B4-BE49-F238E27FC236}">
-                <a16:creationId xmlns:a16="http://schemas.microsoft.com/office/drawing/2014/main" id="{FD70D490-D0D3-844D-A288-DEF6D99890E7}"/>
-              </a:ext>
-            </a:extLst>
-          </p:cNvPr>
-          <p:cNvPicPr>
-            <a:picLocks noChangeAspect="1"/>
-          </p:cNvPicPr>
-          <p:nvPr/>
-        </p:nvPicPr>
-        <p:blipFill>
-          <a:blip r:embed="rId2"/>
-          <a:stretch>
-            <a:fillRect/>
-          </a:stretch>
-        </p:blipFill>
-        <p:spPr>
-          <a:xfrm>
-            <a:off x="6472838" y="365125"/>
-            <a:ext cx="5261962" cy="3423104"/>
-          </a:xfrm>
-          <a:prstGeom prst="rect">
-            <a:avLst/>
-          </a:prstGeom>
-        </p:spPr>
-      </p:pic>
-    </p:spTree>
-    <p:extLst>
-      <p:ext uri="{BB962C8B-B14F-4D97-AF65-F5344CB8AC3E}">
-        <p14:creationId xmlns:p14="http://schemas.microsoft.com/office/powerpoint/2010/main" val="2019983882"/>
-      </p:ext>
-    </p:extLst>
-  </p:cSld>
-  <p:clrMapOvr>
-    <a:masterClrMapping/>
-  </p:clrMapOvr>
-</p:sld>
-</file>
-
 <file path=ppt/slides/slide2.xml><?xml version="1.0" encoding="utf-8"?>
 <p:sld xmlns:a="http://schemas.openxmlformats.org/drawingml/2006/main" xmlns:r="http://schemas.openxmlformats.org/officeDocument/2006/relationships" xmlns:p="http://schemas.openxmlformats.org/presentationml/2006/main">
   <p:cSld>
@@ -6000,594 +5182,6 @@
     <p:extLst>
       <p:ext uri="{BB962C8B-B14F-4D97-AF65-F5344CB8AC3E}">
         <p14:creationId xmlns:p14="http://schemas.microsoft.com/office/powerpoint/2010/main" val="1488589997"/>
-      </p:ext>
-    </p:extLst>
-  </p:cSld>
-  <p:clrMapOvr>
-    <a:masterClrMapping/>
-  </p:clrMapOvr>
-</p:sld>
-</file>
-
-<file path=ppt/slides/slide20.xml><?xml version="1.0" encoding="utf-8"?>
-<p:sld xmlns:a="http://schemas.openxmlformats.org/drawingml/2006/main" xmlns:r="http://schemas.openxmlformats.org/officeDocument/2006/relationships" xmlns:p="http://schemas.openxmlformats.org/presentationml/2006/main">
-  <p:cSld>
-    <p:spTree>
-      <p:nvGrpSpPr>
-        <p:cNvPr id="1" name=""/>
-        <p:cNvGrpSpPr/>
-        <p:nvPr/>
-      </p:nvGrpSpPr>
-      <p:grpSpPr>
-        <a:xfrm>
-          <a:off x="0" y="0"/>
-          <a:ext cx="0" cy="0"/>
-          <a:chOff x="0" y="0"/>
-          <a:chExt cx="0" cy="0"/>
-        </a:xfrm>
-      </p:grpSpPr>
-      <p:sp>
-        <p:nvSpPr>
-          <p:cNvPr id="4" name="Content Placeholder 3">
-            <a:extLst>
-              <a:ext uri="{FF2B5EF4-FFF2-40B4-BE49-F238E27FC236}">
-                <a16:creationId xmlns:a16="http://schemas.microsoft.com/office/drawing/2014/main" id="{134313D6-EA35-AA4C-8B33-AE41A555EEE1}"/>
-              </a:ext>
-            </a:extLst>
-          </p:cNvPr>
-          <p:cNvSpPr>
-            <a:spLocks noGrp="1"/>
-          </p:cNvSpPr>
-          <p:nvPr>
-            <p:ph idx="1"/>
-          </p:nvPr>
-        </p:nvSpPr>
-        <p:spPr>
-          <a:xfrm>
-            <a:off x="838200" y="365125"/>
-            <a:ext cx="10515600" cy="5811838"/>
-          </a:xfrm>
-        </p:spPr>
-        <p:txBody>
-          <a:bodyPr anchor="b"/>
-          <a:lstStyle/>
-          <a:p>
-            <a:pPr marL="0" indent="0">
-              <a:buNone/>
-            </a:pPr>
-            <a:r>
-              <a:rPr lang="en-US" sz="6000" dirty="0">
-                <a:latin typeface="Bernina Sans Light" pitchFamily="2" charset="77"/>
-              </a:rPr>
-              <a:t>Largest</a:t>
-            </a:r>
-            <a:br>
-              <a:rPr lang="en-US" sz="6000" dirty="0">
-                <a:latin typeface="Bernina Sans Light" pitchFamily="2" charset="77"/>
-              </a:rPr>
-            </a:br>
-            <a:r>
-              <a:rPr lang="en-US" sz="6000" dirty="0">
-                <a:latin typeface="Bernina Sans Light" pitchFamily="2" charset="77"/>
-              </a:rPr>
-              <a:t>set of nodes</a:t>
-            </a:r>
-            <a:br>
-              <a:rPr lang="en-US" sz="6000" dirty="0">
-                <a:latin typeface="Bernina Sans Light" pitchFamily="2" charset="77"/>
-              </a:rPr>
-            </a:br>
-            <a:r>
-              <a:rPr lang="en-US" sz="6000" dirty="0">
-                <a:latin typeface="Bernina Sans Light" pitchFamily="2" charset="77"/>
-              </a:rPr>
-              <a:t>that induces</a:t>
-            </a:r>
-            <a:br>
-              <a:rPr lang="en-US" sz="6000" dirty="0">
-                <a:latin typeface="Bernina Sans Light" pitchFamily="2" charset="77"/>
-              </a:rPr>
-            </a:br>
-            <a:r>
-              <a:rPr lang="en-US" sz="6000" dirty="0">
-                <a:latin typeface="Bernina Sans Light" pitchFamily="2" charset="77"/>
-              </a:rPr>
-              <a:t>a subgraph of</a:t>
-            </a:r>
-            <a:br>
-              <a:rPr lang="en-US" sz="6000" dirty="0">
-                <a:latin typeface="Bernina Sans Light" pitchFamily="2" charset="77"/>
-              </a:rPr>
-            </a:br>
-            <a:r>
-              <a:rPr lang="en-US" sz="6000" dirty="0">
-                <a:latin typeface="Bernina Sans Light" pitchFamily="2" charset="77"/>
-              </a:rPr>
-              <a:t>maximum degree 2</a:t>
-            </a:r>
-          </a:p>
-        </p:txBody>
-      </p:sp>
-      <p:pic>
-        <p:nvPicPr>
-          <p:cNvPr id="11" name="Picture 10">
-            <a:extLst>
-              <a:ext uri="{FF2B5EF4-FFF2-40B4-BE49-F238E27FC236}">
-                <a16:creationId xmlns:a16="http://schemas.microsoft.com/office/drawing/2014/main" id="{FD70D490-D0D3-844D-A288-DEF6D99890E7}"/>
-              </a:ext>
-            </a:extLst>
-          </p:cNvPr>
-          <p:cNvPicPr>
-            <a:picLocks noChangeAspect="1"/>
-          </p:cNvPicPr>
-          <p:nvPr/>
-        </p:nvPicPr>
-        <p:blipFill>
-          <a:blip r:embed="rId2"/>
-          <a:stretch>
-            <a:fillRect/>
-          </a:stretch>
-        </p:blipFill>
-        <p:spPr>
-          <a:xfrm>
-            <a:off x="6472838" y="365125"/>
-            <a:ext cx="5261962" cy="3423104"/>
-          </a:xfrm>
-          <a:prstGeom prst="rect">
-            <a:avLst/>
-          </a:prstGeom>
-        </p:spPr>
-      </p:pic>
-    </p:spTree>
-    <p:extLst>
-      <p:ext uri="{BB962C8B-B14F-4D97-AF65-F5344CB8AC3E}">
-        <p14:creationId xmlns:p14="http://schemas.microsoft.com/office/powerpoint/2010/main" val="2615953850"/>
-      </p:ext>
-    </p:extLst>
-  </p:cSld>
-  <p:clrMapOvr>
-    <a:masterClrMapping/>
-  </p:clrMapOvr>
-</p:sld>
-</file>
-
-<file path=ppt/slides/slide21.xml><?xml version="1.0" encoding="utf-8"?>
-<p:sld xmlns:a="http://schemas.openxmlformats.org/drawingml/2006/main" xmlns:r="http://schemas.openxmlformats.org/officeDocument/2006/relationships" xmlns:p="http://schemas.openxmlformats.org/presentationml/2006/main">
-  <p:cSld>
-    <p:spTree>
-      <p:nvGrpSpPr>
-        <p:cNvPr id="1" name=""/>
-        <p:cNvGrpSpPr/>
-        <p:nvPr/>
-      </p:nvGrpSpPr>
-      <p:grpSpPr>
-        <a:xfrm>
-          <a:off x="0" y="0"/>
-          <a:ext cx="0" cy="0"/>
-          <a:chOff x="0" y="0"/>
-          <a:chExt cx="0" cy="0"/>
-        </a:xfrm>
-      </p:grpSpPr>
-      <p:sp>
-        <p:nvSpPr>
-          <p:cNvPr id="4" name="Content Placeholder 3">
-            <a:extLst>
-              <a:ext uri="{FF2B5EF4-FFF2-40B4-BE49-F238E27FC236}">
-                <a16:creationId xmlns:a16="http://schemas.microsoft.com/office/drawing/2014/main" id="{134313D6-EA35-AA4C-8B33-AE41A555EEE1}"/>
-              </a:ext>
-            </a:extLst>
-          </p:cNvPr>
-          <p:cNvSpPr>
-            <a:spLocks noGrp="1"/>
-          </p:cNvSpPr>
-          <p:nvPr>
-            <p:ph idx="1"/>
-          </p:nvPr>
-        </p:nvSpPr>
-        <p:spPr>
-          <a:xfrm>
-            <a:off x="838200" y="365125"/>
-            <a:ext cx="10515600" cy="5811838"/>
-          </a:xfrm>
-        </p:spPr>
-        <p:txBody>
-          <a:bodyPr anchor="b"/>
-          <a:lstStyle/>
-          <a:p>
-            <a:pPr marL="0" indent="0">
-              <a:buNone/>
-            </a:pPr>
-            <a:r>
-              <a:rPr lang="en-US" sz="6000" dirty="0">
-                <a:latin typeface="Bernina Sans Light" pitchFamily="2" charset="77"/>
-              </a:rPr>
-              <a:t>Largest</a:t>
-            </a:r>
-            <a:br>
-              <a:rPr lang="en-US" sz="6000" dirty="0">
-                <a:latin typeface="Bernina Sans Light" pitchFamily="2" charset="77"/>
-              </a:rPr>
-            </a:br>
-            <a:r>
-              <a:rPr lang="en-US" sz="6000" dirty="0">
-                <a:latin typeface="Bernina Sans Light" pitchFamily="2" charset="77"/>
-              </a:rPr>
-              <a:t>set of edges</a:t>
-            </a:r>
-            <a:br>
-              <a:rPr lang="en-US" sz="6000" dirty="0">
-                <a:latin typeface="Bernina Sans Light" pitchFamily="2" charset="77"/>
-              </a:rPr>
-            </a:br>
-            <a:r>
-              <a:rPr lang="en-US" sz="6000" dirty="0">
-                <a:latin typeface="Bernina Sans Light" pitchFamily="2" charset="77"/>
-              </a:rPr>
-              <a:t>that induces</a:t>
-            </a:r>
-            <a:br>
-              <a:rPr lang="en-US" sz="6000" dirty="0">
-                <a:latin typeface="Bernina Sans Light" pitchFamily="2" charset="77"/>
-              </a:rPr>
-            </a:br>
-            <a:r>
-              <a:rPr lang="en-US" sz="6000" dirty="0">
-                <a:latin typeface="Bernina Sans Light" pitchFamily="2" charset="77"/>
-              </a:rPr>
-              <a:t>a subgraph of</a:t>
-            </a:r>
-            <a:br>
-              <a:rPr lang="en-US" sz="6000" dirty="0">
-                <a:latin typeface="Bernina Sans Light" pitchFamily="2" charset="77"/>
-              </a:rPr>
-            </a:br>
-            <a:r>
-              <a:rPr lang="en-US" sz="6000" dirty="0">
-                <a:latin typeface="Bernina Sans Light" pitchFamily="2" charset="77"/>
-              </a:rPr>
-              <a:t>maximum degree 2</a:t>
-            </a:r>
-          </a:p>
-        </p:txBody>
-      </p:sp>
-      <p:pic>
-        <p:nvPicPr>
-          <p:cNvPr id="11" name="Picture 10">
-            <a:extLst>
-              <a:ext uri="{FF2B5EF4-FFF2-40B4-BE49-F238E27FC236}">
-                <a16:creationId xmlns:a16="http://schemas.microsoft.com/office/drawing/2014/main" id="{FD70D490-D0D3-844D-A288-DEF6D99890E7}"/>
-              </a:ext>
-            </a:extLst>
-          </p:cNvPr>
-          <p:cNvPicPr>
-            <a:picLocks noChangeAspect="1"/>
-          </p:cNvPicPr>
-          <p:nvPr/>
-        </p:nvPicPr>
-        <p:blipFill>
-          <a:blip r:embed="rId2"/>
-          <a:stretch>
-            <a:fillRect/>
-          </a:stretch>
-        </p:blipFill>
-        <p:spPr>
-          <a:xfrm>
-            <a:off x="6472838" y="365125"/>
-            <a:ext cx="5261962" cy="3423104"/>
-          </a:xfrm>
-          <a:prstGeom prst="rect">
-            <a:avLst/>
-          </a:prstGeom>
-        </p:spPr>
-      </p:pic>
-    </p:spTree>
-    <p:extLst>
-      <p:ext uri="{BB962C8B-B14F-4D97-AF65-F5344CB8AC3E}">
-        <p14:creationId xmlns:p14="http://schemas.microsoft.com/office/powerpoint/2010/main" val="2185778050"/>
-      </p:ext>
-    </p:extLst>
-  </p:cSld>
-  <p:clrMapOvr>
-    <a:masterClrMapping/>
-  </p:clrMapOvr>
-</p:sld>
-</file>
-
-<file path=ppt/slides/slide22.xml><?xml version="1.0" encoding="utf-8"?>
-<p:sld xmlns:a="http://schemas.openxmlformats.org/drawingml/2006/main" xmlns:r="http://schemas.openxmlformats.org/officeDocument/2006/relationships" xmlns:p="http://schemas.openxmlformats.org/presentationml/2006/main">
-  <p:cSld>
-    <p:spTree>
-      <p:nvGrpSpPr>
-        <p:cNvPr id="1" name=""/>
-        <p:cNvGrpSpPr/>
-        <p:nvPr/>
-      </p:nvGrpSpPr>
-      <p:grpSpPr>
-        <a:xfrm>
-          <a:off x="0" y="0"/>
-          <a:ext cx="0" cy="0"/>
-          <a:chOff x="0" y="0"/>
-          <a:chExt cx="0" cy="0"/>
-        </a:xfrm>
-      </p:grpSpPr>
-      <p:sp>
-        <p:nvSpPr>
-          <p:cNvPr id="4" name="Content Placeholder 3">
-            <a:extLst>
-              <a:ext uri="{FF2B5EF4-FFF2-40B4-BE49-F238E27FC236}">
-                <a16:creationId xmlns:a16="http://schemas.microsoft.com/office/drawing/2014/main" id="{134313D6-EA35-AA4C-8B33-AE41A555EEE1}"/>
-              </a:ext>
-            </a:extLst>
-          </p:cNvPr>
-          <p:cNvSpPr>
-            <a:spLocks noGrp="1"/>
-          </p:cNvSpPr>
-          <p:nvPr>
-            <p:ph idx="1"/>
-          </p:nvPr>
-        </p:nvSpPr>
-        <p:spPr>
-          <a:xfrm>
-            <a:off x="838200" y="365125"/>
-            <a:ext cx="10515600" cy="5811838"/>
-          </a:xfrm>
-        </p:spPr>
-        <p:txBody>
-          <a:bodyPr anchor="b"/>
-          <a:lstStyle/>
-          <a:p>
-            <a:pPr marL="0" indent="0">
-              <a:buNone/>
-            </a:pPr>
-            <a:r>
-              <a:rPr lang="en-US" sz="6000" dirty="0">
-                <a:latin typeface="Bernina Sans Light" pitchFamily="2" charset="77"/>
-              </a:rPr>
-              <a:t>Set of nodes</a:t>
-            </a:r>
-            <a:br>
-              <a:rPr lang="en-US" sz="6000" dirty="0">
-                <a:latin typeface="Bernina Sans Light" pitchFamily="2" charset="77"/>
-              </a:rPr>
-            </a:br>
-            <a:r>
-              <a:rPr lang="en-US" sz="6000" dirty="0">
-                <a:latin typeface="Bernina Sans Light" pitchFamily="2" charset="77"/>
-              </a:rPr>
-              <a:t>that induces</a:t>
-            </a:r>
-            <a:br>
-              <a:rPr lang="en-US" sz="6000" dirty="0">
-                <a:latin typeface="Bernina Sans Light" pitchFamily="2" charset="77"/>
-              </a:rPr>
-            </a:br>
-            <a:r>
-              <a:rPr lang="en-US" sz="6000" dirty="0">
-                <a:latin typeface="Bernina Sans Light" pitchFamily="2" charset="77"/>
-              </a:rPr>
-              <a:t>a 2-regular subgraph</a:t>
-            </a:r>
-          </a:p>
-        </p:txBody>
-      </p:sp>
-      <p:pic>
-        <p:nvPicPr>
-          <p:cNvPr id="11" name="Picture 10">
-            <a:extLst>
-              <a:ext uri="{FF2B5EF4-FFF2-40B4-BE49-F238E27FC236}">
-                <a16:creationId xmlns:a16="http://schemas.microsoft.com/office/drawing/2014/main" id="{FD70D490-D0D3-844D-A288-DEF6D99890E7}"/>
-              </a:ext>
-            </a:extLst>
-          </p:cNvPr>
-          <p:cNvPicPr>
-            <a:picLocks noChangeAspect="1"/>
-          </p:cNvPicPr>
-          <p:nvPr/>
-        </p:nvPicPr>
-        <p:blipFill>
-          <a:blip r:embed="rId2"/>
-          <a:stretch>
-            <a:fillRect/>
-          </a:stretch>
-        </p:blipFill>
-        <p:spPr>
-          <a:xfrm>
-            <a:off x="6472838" y="365125"/>
-            <a:ext cx="5261962" cy="3423104"/>
-          </a:xfrm>
-          <a:prstGeom prst="rect">
-            <a:avLst/>
-          </a:prstGeom>
-        </p:spPr>
-      </p:pic>
-    </p:spTree>
-    <p:extLst>
-      <p:ext uri="{BB962C8B-B14F-4D97-AF65-F5344CB8AC3E}">
-        <p14:creationId xmlns:p14="http://schemas.microsoft.com/office/powerpoint/2010/main" val="1021558575"/>
-      </p:ext>
-    </p:extLst>
-  </p:cSld>
-  <p:clrMapOvr>
-    <a:masterClrMapping/>
-  </p:clrMapOvr>
-</p:sld>
-</file>
-
-<file path=ppt/slides/slide23.xml><?xml version="1.0" encoding="utf-8"?>
-<p:sld xmlns:a="http://schemas.openxmlformats.org/drawingml/2006/main" xmlns:r="http://schemas.openxmlformats.org/officeDocument/2006/relationships" xmlns:p="http://schemas.openxmlformats.org/presentationml/2006/main">
-  <p:cSld>
-    <p:spTree>
-      <p:nvGrpSpPr>
-        <p:cNvPr id="1" name=""/>
-        <p:cNvGrpSpPr/>
-        <p:nvPr/>
-      </p:nvGrpSpPr>
-      <p:grpSpPr>
-        <a:xfrm>
-          <a:off x="0" y="0"/>
-          <a:ext cx="0" cy="0"/>
-          <a:chOff x="0" y="0"/>
-          <a:chExt cx="0" cy="0"/>
-        </a:xfrm>
-      </p:grpSpPr>
-      <p:sp>
-        <p:nvSpPr>
-          <p:cNvPr id="4" name="Content Placeholder 3">
-            <a:extLst>
-              <a:ext uri="{FF2B5EF4-FFF2-40B4-BE49-F238E27FC236}">
-                <a16:creationId xmlns:a16="http://schemas.microsoft.com/office/drawing/2014/main" id="{134313D6-EA35-AA4C-8B33-AE41A555EEE1}"/>
-              </a:ext>
-            </a:extLst>
-          </p:cNvPr>
-          <p:cNvSpPr>
-            <a:spLocks noGrp="1"/>
-          </p:cNvSpPr>
-          <p:nvPr>
-            <p:ph idx="1"/>
-          </p:nvPr>
-        </p:nvSpPr>
-        <p:spPr>
-          <a:xfrm>
-            <a:off x="838200" y="365125"/>
-            <a:ext cx="10515600" cy="5811838"/>
-          </a:xfrm>
-        </p:spPr>
-        <p:txBody>
-          <a:bodyPr anchor="b"/>
-          <a:lstStyle/>
-          <a:p>
-            <a:pPr marL="0" indent="0">
-              <a:buNone/>
-            </a:pPr>
-            <a:r>
-              <a:rPr lang="en-US" sz="6000" dirty="0">
-                <a:latin typeface="Bernina Sans Light" pitchFamily="2" charset="77"/>
-              </a:rPr>
-              <a:t>Nodes </a:t>
-            </a:r>
-            <a:r>
-              <a:rPr lang="en-US" sz="6000" i="1" dirty="0">
-                <a:latin typeface="Bernina Sans Light" pitchFamily="2" charset="77"/>
-              </a:rPr>
-              <a:t>u</a:t>
-            </a:r>
-            <a:br>
-              <a:rPr lang="en-US" sz="6000" dirty="0">
-                <a:latin typeface="Bernina Sans Light" pitchFamily="2" charset="77"/>
-              </a:rPr>
-            </a:br>
-            <a:r>
-              <a:rPr lang="en-US" sz="6000" dirty="0">
-                <a:latin typeface="Bernina Sans Light" pitchFamily="2" charset="77"/>
-              </a:rPr>
-              <a:t>and </a:t>
-            </a:r>
-            <a:r>
-              <a:rPr lang="en-US" sz="6000" i="1" dirty="0">
-                <a:latin typeface="Bernina Sans Light" pitchFamily="2" charset="77"/>
-              </a:rPr>
-              <a:t>v</a:t>
-            </a:r>
-            <a:r>
-              <a:rPr lang="en-US" sz="6000" dirty="0">
-                <a:latin typeface="Bernina Sans Light" pitchFamily="2" charset="77"/>
-              </a:rPr>
-              <a:t> such</a:t>
-            </a:r>
-            <a:br>
-              <a:rPr lang="en-US" sz="6000" dirty="0">
-                <a:latin typeface="Bernina Sans Light" pitchFamily="2" charset="77"/>
-              </a:rPr>
-            </a:br>
-            <a:r>
-              <a:rPr lang="en-US" sz="6000" dirty="0">
-                <a:latin typeface="Bernina Sans Light" pitchFamily="2" charset="77"/>
-              </a:rPr>
-              <a:t>that the distance</a:t>
-            </a:r>
-            <a:br>
-              <a:rPr lang="en-US" sz="6000" dirty="0">
-                <a:latin typeface="Bernina Sans Light" pitchFamily="2" charset="77"/>
-              </a:rPr>
-            </a:br>
-            <a:r>
-              <a:rPr lang="en-US" sz="6000" dirty="0">
-                <a:latin typeface="Bernina Sans Light" pitchFamily="2" charset="77"/>
-              </a:rPr>
-              <a:t>from </a:t>
-            </a:r>
-            <a:r>
-              <a:rPr lang="en-US" sz="6000" i="1" dirty="0">
-                <a:latin typeface="Bernina Sans Light" pitchFamily="2" charset="77"/>
-              </a:rPr>
-              <a:t>u</a:t>
-            </a:r>
-            <a:r>
-              <a:rPr lang="en-US" sz="6000" dirty="0">
-                <a:latin typeface="Bernina Sans Light" pitchFamily="2" charset="77"/>
-              </a:rPr>
-              <a:t> to </a:t>
-            </a:r>
-            <a:r>
-              <a:rPr lang="en-US" sz="6000" i="1" dirty="0">
-                <a:latin typeface="Bernina Sans Light" pitchFamily="2" charset="77"/>
-              </a:rPr>
-              <a:t>v</a:t>
-            </a:r>
-            <a:r>
-              <a:rPr lang="en-US" sz="6000" dirty="0">
-                <a:latin typeface="Bernina Sans Light" pitchFamily="2" charset="77"/>
-              </a:rPr>
-              <a:t> equals</a:t>
-            </a:r>
-            <a:br>
-              <a:rPr lang="en-US" sz="6000" dirty="0">
-                <a:latin typeface="Bernina Sans Light" pitchFamily="2" charset="77"/>
-              </a:rPr>
-            </a:br>
-            <a:r>
-              <a:rPr lang="en-US" sz="6000" dirty="0">
-                <a:latin typeface="Bernina Sans Light" pitchFamily="2" charset="77"/>
-              </a:rPr>
-              <a:t>the diameter of the graph</a:t>
-            </a:r>
-          </a:p>
-        </p:txBody>
-      </p:sp>
-      <p:pic>
-        <p:nvPicPr>
-          <p:cNvPr id="11" name="Picture 10">
-            <a:extLst>
-              <a:ext uri="{FF2B5EF4-FFF2-40B4-BE49-F238E27FC236}">
-                <a16:creationId xmlns:a16="http://schemas.microsoft.com/office/drawing/2014/main" id="{FD70D490-D0D3-844D-A288-DEF6D99890E7}"/>
-              </a:ext>
-            </a:extLst>
-          </p:cNvPr>
-          <p:cNvPicPr>
-            <a:picLocks noChangeAspect="1"/>
-          </p:cNvPicPr>
-          <p:nvPr/>
-        </p:nvPicPr>
-        <p:blipFill>
-          <a:blip r:embed="rId2"/>
-          <a:stretch>
-            <a:fillRect/>
-          </a:stretch>
-        </p:blipFill>
-        <p:spPr>
-          <a:xfrm>
-            <a:off x="6472838" y="365125"/>
-            <a:ext cx="5261962" cy="3423104"/>
-          </a:xfrm>
-          <a:prstGeom prst="rect">
-            <a:avLst/>
-          </a:prstGeom>
-        </p:spPr>
-      </p:pic>
-    </p:spTree>
-    <p:extLst>
-      <p:ext uri="{BB962C8B-B14F-4D97-AF65-F5344CB8AC3E}">
-        <p14:creationId xmlns:p14="http://schemas.microsoft.com/office/powerpoint/2010/main" val="2697539602"/>
       </p:ext>
     </p:extLst>
   </p:cSld>
@@ -7086,64 +5680,6 @@
       </p:grpSpPr>
       <p:sp>
         <p:nvSpPr>
-          <p:cNvPr id="4" name="Title 3">
-            <a:extLst>
-              <a:ext uri="{FF2B5EF4-FFF2-40B4-BE49-F238E27FC236}">
-                <a16:creationId xmlns:a16="http://schemas.microsoft.com/office/drawing/2014/main" id="{5065AD6E-81A6-0346-AD10-4D0CBF22F7FC}"/>
-              </a:ext>
-            </a:extLst>
-          </p:cNvPr>
-          <p:cNvSpPr>
-            <a:spLocks noGrp="1"/>
-          </p:cNvSpPr>
-          <p:nvPr>
-            <p:ph type="title"/>
-          </p:nvPr>
-        </p:nvSpPr>
-        <p:spPr/>
-        <p:txBody>
-          <a:bodyPr/>
-          <a:lstStyle/>
-          <a:p>
-            <a:r>
-              <a:rPr lang="en-US" dirty="0"/>
-              <a:t>Q &amp; A</a:t>
-            </a:r>
-          </a:p>
-        </p:txBody>
-      </p:sp>
-    </p:spTree>
-    <p:extLst>
-      <p:ext uri="{BB962C8B-B14F-4D97-AF65-F5344CB8AC3E}">
-        <p14:creationId xmlns:p14="http://schemas.microsoft.com/office/powerpoint/2010/main" val="1824971739"/>
-      </p:ext>
-    </p:extLst>
-  </p:cSld>
-  <p:clrMapOvr>
-    <a:masterClrMapping/>
-  </p:clrMapOvr>
-</p:sld>
-</file>
-
-<file path=ppt/slides/slide7.xml><?xml version="1.0" encoding="utf-8"?>
-<p:sld xmlns:a="http://schemas.openxmlformats.org/drawingml/2006/main" xmlns:r="http://schemas.openxmlformats.org/officeDocument/2006/relationships" xmlns:p="http://schemas.openxmlformats.org/presentationml/2006/main">
-  <p:cSld>
-    <p:spTree>
-      <p:nvGrpSpPr>
-        <p:cNvPr id="1" name=""/>
-        <p:cNvGrpSpPr/>
-        <p:nvPr/>
-      </p:nvGrpSpPr>
-      <p:grpSpPr>
-        <a:xfrm>
-          <a:off x="0" y="0"/>
-          <a:ext cx="0" cy="0"/>
-          <a:chOff x="0" y="0"/>
-          <a:chExt cx="0" cy="0"/>
-        </a:xfrm>
-      </p:grpSpPr>
-      <p:sp>
-        <p:nvSpPr>
           <p:cNvPr id="4" name="Content Placeholder 3">
             <a:extLst>
               <a:ext uri="{FF2B5EF4-FFF2-40B4-BE49-F238E27FC236}">
@@ -7234,7 +5770,7 @@
 </p:sld>
 </file>
 
-<file path=ppt/slides/slide8.xml><?xml version="1.0" encoding="utf-8"?>
+<file path=ppt/slides/slide7.xml><?xml version="1.0" encoding="utf-8"?>
 <p:sld xmlns:a="http://schemas.openxmlformats.org/drawingml/2006/main" xmlns:r="http://schemas.openxmlformats.org/officeDocument/2006/relationships" xmlns:p="http://schemas.openxmlformats.org/presentationml/2006/main">
   <p:cSld>
     <p:spTree>
@@ -7343,7 +5879,7 @@
 </p:sld>
 </file>
 
-<file path=ppt/slides/slide9.xml><?xml version="1.0" encoding="utf-8"?>
+<file path=ppt/slides/slide8.xml><?xml version="1.0" encoding="utf-8"?>
 <p:sld xmlns:a="http://schemas.openxmlformats.org/drawingml/2006/main" xmlns:r="http://schemas.openxmlformats.org/officeDocument/2006/relationships" xmlns:p="http://schemas.openxmlformats.org/presentationml/2006/main">
   <p:cSld>
     <p:spTree>
@@ -7443,6 +5979,148 @@
     <p:extLst>
       <p:ext uri="{BB962C8B-B14F-4D97-AF65-F5344CB8AC3E}">
         <p14:creationId xmlns:p14="http://schemas.microsoft.com/office/powerpoint/2010/main" val="4294147878"/>
+      </p:ext>
+    </p:extLst>
+  </p:cSld>
+  <p:clrMapOvr>
+    <a:masterClrMapping/>
+  </p:clrMapOvr>
+</p:sld>
+</file>
+
+<file path=ppt/slides/slide9.xml><?xml version="1.0" encoding="utf-8"?>
+<p:sld xmlns:a="http://schemas.openxmlformats.org/drawingml/2006/main" xmlns:r="http://schemas.openxmlformats.org/officeDocument/2006/relationships" xmlns:p="http://schemas.openxmlformats.org/presentationml/2006/main">
+  <p:cSld>
+    <p:spTree>
+      <p:nvGrpSpPr>
+        <p:cNvPr id="1" name=""/>
+        <p:cNvGrpSpPr/>
+        <p:nvPr/>
+      </p:nvGrpSpPr>
+      <p:grpSpPr>
+        <a:xfrm>
+          <a:off x="0" y="0"/>
+          <a:ext cx="0" cy="0"/>
+          <a:chOff x="0" y="0"/>
+          <a:chExt cx="0" cy="0"/>
+        </a:xfrm>
+      </p:grpSpPr>
+      <p:sp>
+        <p:nvSpPr>
+          <p:cNvPr id="4" name="Content Placeholder 3">
+            <a:extLst>
+              <a:ext uri="{FF2B5EF4-FFF2-40B4-BE49-F238E27FC236}">
+                <a16:creationId xmlns:a16="http://schemas.microsoft.com/office/drawing/2014/main" id="{134313D6-EA35-AA4C-8B33-AE41A555EEE1}"/>
+              </a:ext>
+            </a:extLst>
+          </p:cNvPr>
+          <p:cNvSpPr>
+            <a:spLocks noGrp="1"/>
+          </p:cNvSpPr>
+          <p:nvPr>
+            <p:ph idx="1"/>
+          </p:nvPr>
+        </p:nvSpPr>
+        <p:spPr>
+          <a:xfrm>
+            <a:off x="838200" y="365125"/>
+            <a:ext cx="10515600" cy="5811838"/>
+          </a:xfrm>
+        </p:spPr>
+        <p:txBody>
+          <a:bodyPr anchor="b"/>
+          <a:lstStyle/>
+          <a:p>
+            <a:pPr marL="0" indent="0">
+              <a:buNone/>
+            </a:pPr>
+            <a:r>
+              <a:rPr lang="en-US" sz="6000" dirty="0">
+                <a:latin typeface="Bernina Sans Light" pitchFamily="2" charset="77"/>
+              </a:rPr>
+              <a:t>Smallest</a:t>
+            </a:r>
+            <a:br>
+              <a:rPr lang="en-US" sz="6000" dirty="0">
+                <a:latin typeface="Bernina Sans Light" pitchFamily="2" charset="77"/>
+              </a:rPr>
+            </a:br>
+            <a:r>
+              <a:rPr lang="en-US" sz="6000" dirty="0">
+                <a:latin typeface="Bernina Sans Light" pitchFamily="2" charset="77"/>
+              </a:rPr>
+              <a:t>set of nodes</a:t>
+            </a:r>
+            <a:br>
+              <a:rPr lang="en-US" sz="6000" dirty="0">
+                <a:latin typeface="Bernina Sans Light" pitchFamily="2" charset="77"/>
+              </a:rPr>
+            </a:br>
+            <a:r>
+              <a:rPr lang="en-US" sz="6000" dirty="0">
+                <a:latin typeface="Bernina Sans Light" pitchFamily="2" charset="77"/>
+              </a:rPr>
+              <a:t>that is both</a:t>
+            </a:r>
+            <a:br>
+              <a:rPr lang="en-US" sz="6000" dirty="0">
+                <a:latin typeface="Bernina Sans Light" pitchFamily="2" charset="77"/>
+              </a:rPr>
+            </a:br>
+            <a:r>
+              <a:rPr lang="en-US" sz="6000" dirty="0">
+                <a:latin typeface="Bernina Sans Light" pitchFamily="2" charset="77"/>
+              </a:rPr>
+              <a:t>an independent set</a:t>
+            </a:r>
+            <a:br>
+              <a:rPr lang="en-US" sz="6000" dirty="0">
+                <a:latin typeface="Bernina Sans Light" pitchFamily="2" charset="77"/>
+              </a:rPr>
+            </a:br>
+            <a:r>
+              <a:rPr lang="en-US" sz="6000" dirty="0">
+                <a:latin typeface="Bernina Sans Light" pitchFamily="2" charset="77"/>
+              </a:rPr>
+              <a:t>and a dominating set</a:t>
+            </a:r>
+          </a:p>
+        </p:txBody>
+      </p:sp>
+      <p:pic>
+        <p:nvPicPr>
+          <p:cNvPr id="11" name="Picture 10">
+            <a:extLst>
+              <a:ext uri="{FF2B5EF4-FFF2-40B4-BE49-F238E27FC236}">
+                <a16:creationId xmlns:a16="http://schemas.microsoft.com/office/drawing/2014/main" id="{FD70D490-D0D3-844D-A288-DEF6D99890E7}"/>
+              </a:ext>
+            </a:extLst>
+          </p:cNvPr>
+          <p:cNvPicPr>
+            <a:picLocks noChangeAspect="1"/>
+          </p:cNvPicPr>
+          <p:nvPr/>
+        </p:nvPicPr>
+        <p:blipFill>
+          <a:blip r:embed="rId2"/>
+          <a:stretch>
+            <a:fillRect/>
+          </a:stretch>
+        </p:blipFill>
+        <p:spPr>
+          <a:xfrm>
+            <a:off x="6472838" y="365125"/>
+            <a:ext cx="5261962" cy="3423104"/>
+          </a:xfrm>
+          <a:prstGeom prst="rect">
+            <a:avLst/>
+          </a:prstGeom>
+        </p:spPr>
+      </p:pic>
+    </p:spTree>
+    <p:extLst>
+      <p:ext uri="{BB962C8B-B14F-4D97-AF65-F5344CB8AC3E}">
+        <p14:creationId xmlns:p14="http://schemas.microsoft.com/office/powerpoint/2010/main" val="1836756029"/>
       </p:ext>
     </p:extLst>
   </p:cSld>

</xml_diff>